<commit_message>
Add a BigData Intro
</commit_message>
<xml_diff>
--- a/ppt/ad_tech_img.pptx
+++ b/ppt/ad_tech_img.pptx
@@ -8,6 +8,7 @@
     <p:sldId id="257" r:id="rId2"/>
     <p:sldId id="259" r:id="rId3"/>
     <p:sldId id="260" r:id="rId4"/>
+    <p:sldId id="261" r:id="rId5"/>
   </p:sldIdLst>
   <p:sldSz cx="9144000" cy="6858000" type="screen4x3"/>
   <p:notesSz cx="6858000" cy="9144000"/>
@@ -290,7 +291,7 @@
           <a:p>
             <a:fld id="{8631857F-C886-4D4D-87CA-9FA06DD642F4}" type="datetimeFigureOut">
               <a:rPr kumimoji="1" lang="ja-JP" altLang="en-US" smtClean="0"/>
-              <a:t>2014/11/07</a:t>
+              <a:t>2014/12/16</a:t>
             </a:fld>
             <a:endParaRPr kumimoji="1" lang="ja-JP" altLang="en-US"/>
           </a:p>
@@ -492,7 +493,7 @@
           <a:p>
             <a:fld id="{8631857F-C886-4D4D-87CA-9FA06DD642F4}" type="datetimeFigureOut">
               <a:rPr kumimoji="1" lang="ja-JP" altLang="en-US" smtClean="0"/>
-              <a:t>2014/11/07</a:t>
+              <a:t>2014/12/16</a:t>
             </a:fld>
             <a:endParaRPr kumimoji="1" lang="ja-JP" altLang="en-US"/>
           </a:p>
@@ -704,7 +705,7 @@
           <a:p>
             <a:fld id="{8631857F-C886-4D4D-87CA-9FA06DD642F4}" type="datetimeFigureOut">
               <a:rPr kumimoji="1" lang="ja-JP" altLang="en-US" smtClean="0"/>
-              <a:t>2014/11/07</a:t>
+              <a:t>2014/12/16</a:t>
             </a:fld>
             <a:endParaRPr kumimoji="1" lang="ja-JP" altLang="en-US"/>
           </a:p>
@@ -906,7 +907,7 @@
           <a:p>
             <a:fld id="{8631857F-C886-4D4D-87CA-9FA06DD642F4}" type="datetimeFigureOut">
               <a:rPr kumimoji="1" lang="ja-JP" altLang="en-US" smtClean="0"/>
-              <a:t>2014/11/07</a:t>
+              <a:t>2014/12/16</a:t>
             </a:fld>
             <a:endParaRPr kumimoji="1" lang="ja-JP" altLang="en-US"/>
           </a:p>
@@ -1152,7 +1153,7 @@
           <a:p>
             <a:fld id="{8631857F-C886-4D4D-87CA-9FA06DD642F4}" type="datetimeFigureOut">
               <a:rPr kumimoji="1" lang="ja-JP" altLang="en-US" smtClean="0"/>
-              <a:t>2014/11/07</a:t>
+              <a:t>2014/12/16</a:t>
             </a:fld>
             <a:endParaRPr kumimoji="1" lang="ja-JP" altLang="en-US"/>
           </a:p>
@@ -1504,7 +1505,7 @@
           <a:p>
             <a:fld id="{8631857F-C886-4D4D-87CA-9FA06DD642F4}" type="datetimeFigureOut">
               <a:rPr kumimoji="1" lang="ja-JP" altLang="en-US" smtClean="0"/>
-              <a:t>2014/11/07</a:t>
+              <a:t>2014/12/16</a:t>
             </a:fld>
             <a:endParaRPr kumimoji="1" lang="ja-JP" altLang="en-US"/>
           </a:p>
@@ -1990,7 +1991,7 @@
           <a:p>
             <a:fld id="{8631857F-C886-4D4D-87CA-9FA06DD642F4}" type="datetimeFigureOut">
               <a:rPr kumimoji="1" lang="ja-JP" altLang="en-US" smtClean="0"/>
-              <a:t>2014/11/07</a:t>
+              <a:t>2014/12/16</a:t>
             </a:fld>
             <a:endParaRPr kumimoji="1" lang="ja-JP" altLang="en-US"/>
           </a:p>
@@ -2108,7 +2109,7 @@
           <a:p>
             <a:fld id="{8631857F-C886-4D4D-87CA-9FA06DD642F4}" type="datetimeFigureOut">
               <a:rPr kumimoji="1" lang="ja-JP" altLang="en-US" smtClean="0"/>
-              <a:t>2014/11/07</a:t>
+              <a:t>2014/12/16</a:t>
             </a:fld>
             <a:endParaRPr kumimoji="1" lang="ja-JP" altLang="en-US"/>
           </a:p>
@@ -2203,7 +2204,7 @@
           <a:p>
             <a:fld id="{8631857F-C886-4D4D-87CA-9FA06DD642F4}" type="datetimeFigureOut">
               <a:rPr kumimoji="1" lang="ja-JP" altLang="en-US" smtClean="0"/>
-              <a:t>2014/11/07</a:t>
+              <a:t>2014/12/16</a:t>
             </a:fld>
             <a:endParaRPr kumimoji="1" lang="ja-JP" altLang="en-US"/>
           </a:p>
@@ -2512,7 +2513,7 @@
           <a:p>
             <a:fld id="{8631857F-C886-4D4D-87CA-9FA06DD642F4}" type="datetimeFigureOut">
               <a:rPr kumimoji="1" lang="ja-JP" altLang="en-US" smtClean="0"/>
-              <a:t>2014/11/07</a:t>
+              <a:t>2014/12/16</a:t>
             </a:fld>
             <a:endParaRPr kumimoji="1" lang="ja-JP" altLang="en-US"/>
           </a:p>
@@ -2765,7 +2766,7 @@
           <a:p>
             <a:fld id="{8631857F-C886-4D4D-87CA-9FA06DD642F4}" type="datetimeFigureOut">
               <a:rPr kumimoji="1" lang="ja-JP" altLang="en-US" smtClean="0"/>
-              <a:t>2014/11/07</a:t>
+              <a:t>2014/12/16</a:t>
             </a:fld>
             <a:endParaRPr kumimoji="1" lang="ja-JP" altLang="en-US"/>
           </a:p>
@@ -3010,7 +3011,7 @@
           <a:p>
             <a:fld id="{8631857F-C886-4D4D-87CA-9FA06DD642F4}" type="datetimeFigureOut">
               <a:rPr kumimoji="1" lang="ja-JP" altLang="en-US" smtClean="0"/>
-              <a:t>2014/11/07</a:t>
+              <a:t>2014/12/16</a:t>
             </a:fld>
             <a:endParaRPr kumimoji="1" lang="ja-JP" altLang="en-US"/>
           </a:p>
@@ -5943,6 +5944,1210 @@
 </p:sld>
 </file>
 
+<file path=ppt/slides/slide4.xml><?xml version="1.0" encoding="utf-8"?>
+<p:sld xmlns:a="http://schemas.openxmlformats.org/drawingml/2006/main" xmlns:r="http://schemas.openxmlformats.org/officeDocument/2006/relationships" xmlns:p="http://schemas.openxmlformats.org/presentationml/2006/main">
+  <p:cSld>
+    <p:spTree>
+      <p:nvGrpSpPr>
+        <p:cNvPr id="1" name=""/>
+        <p:cNvGrpSpPr/>
+        <p:nvPr/>
+      </p:nvGrpSpPr>
+      <p:grpSpPr>
+        <a:xfrm>
+          <a:off x="0" y="0"/>
+          <a:ext cx="0" cy="0"/>
+          <a:chOff x="0" y="0"/>
+          <a:chExt cx="0" cy="0"/>
+        </a:xfrm>
+      </p:grpSpPr>
+      <p:grpSp>
+        <p:nvGrpSpPr>
+          <p:cNvPr id="40" name="図形グループ 39"/>
+          <p:cNvGrpSpPr/>
+          <p:nvPr/>
+        </p:nvGrpSpPr>
+        <p:grpSpPr>
+          <a:xfrm>
+            <a:off x="131054" y="181422"/>
+            <a:ext cx="9012946" cy="6508642"/>
+            <a:chOff x="131054" y="181422"/>
+            <a:chExt cx="9012946" cy="6508642"/>
+          </a:xfrm>
+        </p:grpSpPr>
+        <p:cxnSp>
+          <p:nvCxnSpPr>
+            <p:cNvPr id="3" name="直線矢印コネクタ 2"/>
+            <p:cNvCxnSpPr/>
+            <p:nvPr/>
+          </p:nvCxnSpPr>
+          <p:spPr>
+            <a:xfrm>
+              <a:off x="629699" y="3244243"/>
+              <a:ext cx="7460352" cy="0"/>
+            </a:xfrm>
+            <a:prstGeom prst="straightConnector1">
+              <a:avLst/>
+            </a:prstGeom>
+            <a:ln>
+              <a:solidFill>
+                <a:schemeClr val="tx1"/>
+              </a:solidFill>
+              <a:headEnd type="arrow"/>
+              <a:tailEnd type="arrow"/>
+            </a:ln>
+          </p:spPr>
+          <p:style>
+            <a:lnRef idx="2">
+              <a:schemeClr val="accent1"/>
+            </a:lnRef>
+            <a:fillRef idx="0">
+              <a:schemeClr val="accent1"/>
+            </a:fillRef>
+            <a:effectRef idx="1">
+              <a:schemeClr val="accent1"/>
+            </a:effectRef>
+            <a:fontRef idx="minor">
+              <a:schemeClr val="tx1"/>
+            </a:fontRef>
+          </p:style>
+        </p:cxnSp>
+        <p:cxnSp>
+          <p:nvCxnSpPr>
+            <p:cNvPr id="4" name="直線矢印コネクタ 3"/>
+            <p:cNvCxnSpPr/>
+            <p:nvPr/>
+          </p:nvCxnSpPr>
+          <p:spPr>
+            <a:xfrm>
+              <a:off x="4162426" y="565608"/>
+              <a:ext cx="0" cy="5645411"/>
+            </a:xfrm>
+            <a:prstGeom prst="straightConnector1">
+              <a:avLst/>
+            </a:prstGeom>
+            <a:ln>
+              <a:solidFill>
+                <a:schemeClr val="tx1"/>
+              </a:solidFill>
+              <a:headEnd type="arrow"/>
+              <a:tailEnd type="arrow"/>
+            </a:ln>
+          </p:spPr>
+          <p:style>
+            <a:lnRef idx="2">
+              <a:schemeClr val="accent1"/>
+            </a:lnRef>
+            <a:fillRef idx="0">
+              <a:schemeClr val="accent1"/>
+            </a:fillRef>
+            <a:effectRef idx="1">
+              <a:schemeClr val="accent1"/>
+            </a:effectRef>
+            <a:fontRef idx="minor">
+              <a:schemeClr val="tx1"/>
+            </a:fontRef>
+          </p:style>
+        </p:cxnSp>
+        <p:sp>
+          <p:nvSpPr>
+            <p:cNvPr id="11" name="テキスト ボックス 10"/>
+            <p:cNvSpPr txBox="1"/>
+            <p:nvPr/>
+          </p:nvSpPr>
+          <p:spPr>
+            <a:xfrm>
+              <a:off x="2529475" y="181422"/>
+              <a:ext cx="3543400" cy="369332"/>
+            </a:xfrm>
+            <a:prstGeom prst="rect">
+              <a:avLst/>
+            </a:prstGeom>
+            <a:noFill/>
+          </p:spPr>
+          <p:txBody>
+            <a:bodyPr wrap="square" rtlCol="0">
+              <a:spAutoFit/>
+            </a:bodyPr>
+            <a:lstStyle/>
+            <a:p>
+              <a:r>
+                <a:rPr kumimoji="1" lang="en-US" altLang="ja-JP" dirty="0" smtClean="0"/>
+                <a:t>Impression channel/ Non targeting</a:t>
+              </a:r>
+              <a:endParaRPr kumimoji="1" lang="ja-JP" altLang="en-US" dirty="0"/>
+            </a:p>
+          </p:txBody>
+        </p:sp>
+        <p:sp>
+          <p:nvSpPr>
+            <p:cNvPr id="12" name="テキスト ボックス 11"/>
+            <p:cNvSpPr txBox="1"/>
+            <p:nvPr/>
+          </p:nvSpPr>
+          <p:spPr>
+            <a:xfrm>
+              <a:off x="2529475" y="6320732"/>
+              <a:ext cx="3543400" cy="369332"/>
+            </a:xfrm>
+            <a:prstGeom prst="rect">
+              <a:avLst/>
+            </a:prstGeom>
+            <a:noFill/>
+          </p:spPr>
+          <p:txBody>
+            <a:bodyPr wrap="square" rtlCol="0">
+              <a:spAutoFit/>
+            </a:bodyPr>
+            <a:lstStyle/>
+            <a:p>
+              <a:r>
+                <a:rPr lang="en-US" altLang="ja-JP" dirty="0" smtClean="0"/>
+                <a:t>Response </a:t>
+              </a:r>
+              <a:r>
+                <a:rPr kumimoji="1" lang="en-US" altLang="ja-JP" dirty="0" smtClean="0"/>
+                <a:t>channel/ Targeting</a:t>
+              </a:r>
+              <a:endParaRPr kumimoji="1" lang="ja-JP" altLang="en-US" dirty="0"/>
+            </a:p>
+          </p:txBody>
+        </p:sp>
+        <p:sp>
+          <p:nvSpPr>
+            <p:cNvPr id="13" name="テキスト ボックス 12"/>
+            <p:cNvSpPr txBox="1"/>
+            <p:nvPr/>
+          </p:nvSpPr>
+          <p:spPr>
+            <a:xfrm>
+              <a:off x="131054" y="3364629"/>
+              <a:ext cx="786815" cy="369332"/>
+            </a:xfrm>
+            <a:prstGeom prst="rect">
+              <a:avLst/>
+            </a:prstGeom>
+            <a:noFill/>
+          </p:spPr>
+          <p:txBody>
+            <a:bodyPr wrap="square" rtlCol="0">
+              <a:spAutoFit/>
+            </a:bodyPr>
+            <a:lstStyle/>
+            <a:p>
+              <a:r>
+                <a:rPr kumimoji="1" lang="en-US" altLang="ja-JP" dirty="0" smtClean="0"/>
+                <a:t>push</a:t>
+              </a:r>
+              <a:endParaRPr kumimoji="1" lang="ja-JP" altLang="en-US" dirty="0"/>
+            </a:p>
+          </p:txBody>
+        </p:sp>
+        <p:sp>
+          <p:nvSpPr>
+            <p:cNvPr id="14" name="テキスト ボックス 13"/>
+            <p:cNvSpPr txBox="1"/>
+            <p:nvPr/>
+          </p:nvSpPr>
+          <p:spPr>
+            <a:xfrm>
+              <a:off x="7719791" y="3364629"/>
+              <a:ext cx="1424209" cy="369332"/>
+            </a:xfrm>
+            <a:prstGeom prst="rect">
+              <a:avLst/>
+            </a:prstGeom>
+            <a:noFill/>
+          </p:spPr>
+          <p:txBody>
+            <a:bodyPr wrap="square" rtlCol="0">
+              <a:spAutoFit/>
+            </a:bodyPr>
+            <a:lstStyle/>
+            <a:p>
+              <a:r>
+                <a:rPr kumimoji="1" lang="en-US" altLang="ja-JP" dirty="0" smtClean="0"/>
+                <a:t>pull</a:t>
+              </a:r>
+              <a:endParaRPr kumimoji="1" lang="ja-JP" altLang="en-US" dirty="0"/>
+            </a:p>
+          </p:txBody>
+        </p:sp>
+        <p:sp>
+          <p:nvSpPr>
+            <p:cNvPr id="17" name="円/楕円 16"/>
+            <p:cNvSpPr/>
+            <p:nvPr/>
+          </p:nvSpPr>
+          <p:spPr>
+            <a:xfrm>
+              <a:off x="3047735" y="1273594"/>
+              <a:ext cx="773160" cy="487262"/>
+            </a:xfrm>
+            <a:prstGeom prst="ellipse">
+              <a:avLst/>
+            </a:prstGeom>
+          </p:spPr>
+          <p:style>
+            <a:lnRef idx="1">
+              <a:schemeClr val="accent1"/>
+            </a:lnRef>
+            <a:fillRef idx="3">
+              <a:schemeClr val="accent1"/>
+            </a:fillRef>
+            <a:effectRef idx="2">
+              <a:schemeClr val="accent1"/>
+            </a:effectRef>
+            <a:fontRef idx="minor">
+              <a:schemeClr val="lt1"/>
+            </a:fontRef>
+          </p:style>
+          <p:txBody>
+            <a:bodyPr rtlCol="0" anchor="ctr"/>
+            <a:lstStyle/>
+            <a:p>
+              <a:pPr algn="ctr"/>
+              <a:r>
+                <a:rPr kumimoji="1" lang="ja-JP" altLang="en-US" sz="1200" dirty="0" smtClean="0"/>
+                <a:t>新聞</a:t>
+              </a:r>
+              <a:endParaRPr kumimoji="1" lang="ja-JP" altLang="en-US" sz="1200" dirty="0"/>
+            </a:p>
+          </p:txBody>
+        </p:sp>
+        <p:sp>
+          <p:nvSpPr>
+            <p:cNvPr id="18" name="円/楕円 17"/>
+            <p:cNvSpPr/>
+            <p:nvPr/>
+          </p:nvSpPr>
+          <p:spPr>
+            <a:xfrm>
+              <a:off x="2841969" y="1849874"/>
+              <a:ext cx="867484" cy="497933"/>
+            </a:xfrm>
+            <a:prstGeom prst="ellipse">
+              <a:avLst/>
+            </a:prstGeom>
+          </p:spPr>
+          <p:style>
+            <a:lnRef idx="1">
+              <a:schemeClr val="accent1"/>
+            </a:lnRef>
+            <a:fillRef idx="3">
+              <a:schemeClr val="accent1"/>
+            </a:fillRef>
+            <a:effectRef idx="2">
+              <a:schemeClr val="accent1"/>
+            </a:effectRef>
+            <a:fontRef idx="minor">
+              <a:schemeClr val="lt1"/>
+            </a:fontRef>
+          </p:style>
+          <p:txBody>
+            <a:bodyPr rtlCol="0" anchor="ctr"/>
+            <a:lstStyle/>
+            <a:p>
+              <a:pPr algn="ctr"/>
+              <a:r>
+                <a:rPr kumimoji="1" lang="ja-JP" altLang="en-US" sz="1200" dirty="0" smtClean="0"/>
+                <a:t>雑誌</a:t>
+              </a:r>
+              <a:endParaRPr kumimoji="1" lang="ja-JP" altLang="en-US" sz="1200" dirty="0"/>
+            </a:p>
+          </p:txBody>
+        </p:sp>
+        <p:sp>
+          <p:nvSpPr>
+            <p:cNvPr id="20" name="円/楕円 19"/>
+            <p:cNvSpPr/>
+            <p:nvPr/>
+          </p:nvSpPr>
+          <p:spPr>
+            <a:xfrm>
+              <a:off x="2967063" y="738956"/>
+              <a:ext cx="757775" cy="461234"/>
+            </a:xfrm>
+            <a:prstGeom prst="ellipse">
+              <a:avLst/>
+            </a:prstGeom>
+          </p:spPr>
+          <p:style>
+            <a:lnRef idx="1">
+              <a:schemeClr val="accent1"/>
+            </a:lnRef>
+            <a:fillRef idx="3">
+              <a:schemeClr val="accent1"/>
+            </a:fillRef>
+            <a:effectRef idx="2">
+              <a:schemeClr val="accent1"/>
+            </a:effectRef>
+            <a:fontRef idx="minor">
+              <a:schemeClr val="lt1"/>
+            </a:fontRef>
+          </p:style>
+          <p:txBody>
+            <a:bodyPr rtlCol="0" anchor="ctr"/>
+            <a:lstStyle/>
+            <a:p>
+              <a:pPr algn="ctr"/>
+              <a:r>
+                <a:rPr kumimoji="1" lang="en-US" altLang="ja-JP" sz="1200" dirty="0" smtClean="0"/>
+                <a:t>OOH</a:t>
+              </a:r>
+              <a:endParaRPr kumimoji="1" lang="ja-JP" altLang="en-US" sz="1200" dirty="0"/>
+            </a:p>
+          </p:txBody>
+        </p:sp>
+        <p:sp>
+          <p:nvSpPr>
+            <p:cNvPr id="21" name="円/楕円 20"/>
+            <p:cNvSpPr/>
+            <p:nvPr/>
+          </p:nvSpPr>
+          <p:spPr>
+            <a:xfrm>
+              <a:off x="2116212" y="3438144"/>
+              <a:ext cx="1704683" cy="1053519"/>
+            </a:xfrm>
+            <a:prstGeom prst="ellipse">
+              <a:avLst/>
+            </a:prstGeom>
+            <a:solidFill>
+              <a:schemeClr val="accent4">
+                <a:lumMod val="75000"/>
+              </a:schemeClr>
+            </a:solidFill>
+          </p:spPr>
+          <p:style>
+            <a:lnRef idx="1">
+              <a:schemeClr val="accent1"/>
+            </a:lnRef>
+            <a:fillRef idx="3">
+              <a:schemeClr val="accent1"/>
+            </a:fillRef>
+            <a:effectRef idx="2">
+              <a:schemeClr val="accent1"/>
+            </a:effectRef>
+            <a:fontRef idx="minor">
+              <a:schemeClr val="lt1"/>
+            </a:fontRef>
+          </p:style>
+          <p:txBody>
+            <a:bodyPr rtlCol="0" anchor="ctr"/>
+            <a:lstStyle/>
+            <a:p>
+              <a:pPr algn="ctr"/>
+              <a:r>
+                <a:rPr kumimoji="1" lang="en-US" altLang="ja-JP" dirty="0" smtClean="0"/>
+                <a:t>DSP</a:t>
+              </a:r>
+              <a:endParaRPr kumimoji="1" lang="ja-JP" altLang="en-US" dirty="0"/>
+            </a:p>
+          </p:txBody>
+        </p:sp>
+        <p:sp>
+          <p:nvSpPr>
+            <p:cNvPr id="22" name="円/楕円 21"/>
+            <p:cNvSpPr/>
+            <p:nvPr/>
+          </p:nvSpPr>
+          <p:spPr>
+            <a:xfrm>
+              <a:off x="1067289" y="2837869"/>
+              <a:ext cx="1451513" cy="1053519"/>
+            </a:xfrm>
+            <a:prstGeom prst="ellipse">
+              <a:avLst/>
+            </a:prstGeom>
+            <a:solidFill>
+              <a:schemeClr val="accent4">
+                <a:lumMod val="75000"/>
+              </a:schemeClr>
+            </a:solidFill>
+          </p:spPr>
+          <p:style>
+            <a:lnRef idx="1">
+              <a:schemeClr val="accent1"/>
+            </a:lnRef>
+            <a:fillRef idx="3">
+              <a:schemeClr val="accent1"/>
+            </a:fillRef>
+            <a:effectRef idx="2">
+              <a:schemeClr val="accent1"/>
+            </a:effectRef>
+            <a:fontRef idx="minor">
+              <a:schemeClr val="lt1"/>
+            </a:fontRef>
+          </p:style>
+          <p:txBody>
+            <a:bodyPr rtlCol="0" anchor="ctr"/>
+            <a:lstStyle/>
+            <a:p>
+              <a:pPr algn="ctr"/>
+              <a:r>
+                <a:rPr kumimoji="1" lang="ja-JP" altLang="en-US" dirty="0" smtClean="0"/>
+                <a:t>動画</a:t>
+              </a:r>
+              <a:r>
+                <a:rPr kumimoji="1" lang="en-US" altLang="ja-JP" dirty="0" smtClean="0"/>
+                <a:t>DSP</a:t>
+              </a:r>
+              <a:endParaRPr kumimoji="1" lang="ja-JP" altLang="en-US" dirty="0"/>
+            </a:p>
+          </p:txBody>
+        </p:sp>
+        <p:sp>
+          <p:nvSpPr>
+            <p:cNvPr id="23" name="円/楕円 22"/>
+            <p:cNvSpPr/>
+            <p:nvPr/>
+          </p:nvSpPr>
+          <p:spPr>
+            <a:xfrm>
+              <a:off x="1206037" y="4190338"/>
+              <a:ext cx="1451513" cy="773400"/>
+            </a:xfrm>
+            <a:prstGeom prst="ellipse">
+              <a:avLst/>
+            </a:prstGeom>
+            <a:solidFill>
+              <a:schemeClr val="accent4">
+                <a:lumMod val="75000"/>
+              </a:schemeClr>
+            </a:solidFill>
+          </p:spPr>
+          <p:style>
+            <a:lnRef idx="1">
+              <a:schemeClr val="accent1"/>
+            </a:lnRef>
+            <a:fillRef idx="3">
+              <a:schemeClr val="accent1"/>
+            </a:fillRef>
+            <a:effectRef idx="2">
+              <a:schemeClr val="accent1"/>
+            </a:effectRef>
+            <a:fontRef idx="minor">
+              <a:schemeClr val="lt1"/>
+            </a:fontRef>
+          </p:style>
+          <p:txBody>
+            <a:bodyPr rtlCol="0" anchor="ctr"/>
+            <a:lstStyle/>
+            <a:p>
+              <a:pPr algn="ctr"/>
+              <a:r>
+                <a:rPr kumimoji="1" lang="ja-JP" altLang="en-US" sz="1400" dirty="0" smtClean="0"/>
+                <a:t>ネット</a:t>
+              </a:r>
+              <a:endParaRPr kumimoji="1" lang="en-US" altLang="ja-JP" sz="1400" dirty="0" smtClean="0"/>
+            </a:p>
+            <a:p>
+              <a:pPr algn="ctr"/>
+              <a:r>
+                <a:rPr kumimoji="1" lang="ja-JP" altLang="en-US" sz="1400" dirty="0" smtClean="0"/>
+                <a:t>広告</a:t>
+              </a:r>
+              <a:endParaRPr kumimoji="1" lang="ja-JP" altLang="en-US" sz="1400" dirty="0"/>
+            </a:p>
+          </p:txBody>
+        </p:sp>
+        <p:sp>
+          <p:nvSpPr>
+            <p:cNvPr id="24" name="円/楕円 23"/>
+            <p:cNvSpPr/>
+            <p:nvPr/>
+          </p:nvSpPr>
+          <p:spPr>
+            <a:xfrm>
+              <a:off x="2518802" y="4878363"/>
+              <a:ext cx="1010945" cy="773400"/>
+            </a:xfrm>
+            <a:prstGeom prst="ellipse">
+              <a:avLst/>
+            </a:prstGeom>
+            <a:solidFill>
+              <a:schemeClr val="accent4">
+                <a:lumMod val="75000"/>
+              </a:schemeClr>
+            </a:solidFill>
+          </p:spPr>
+          <p:style>
+            <a:lnRef idx="1">
+              <a:schemeClr val="accent1"/>
+            </a:lnRef>
+            <a:fillRef idx="3">
+              <a:schemeClr val="accent1"/>
+            </a:fillRef>
+            <a:effectRef idx="2">
+              <a:schemeClr val="accent1"/>
+            </a:effectRef>
+            <a:fontRef idx="minor">
+              <a:schemeClr val="lt1"/>
+            </a:fontRef>
+          </p:style>
+          <p:txBody>
+            <a:bodyPr rtlCol="0" anchor="ctr"/>
+            <a:lstStyle/>
+            <a:p>
+              <a:pPr algn="ctr"/>
+              <a:r>
+                <a:rPr kumimoji="1" lang="ja-JP" altLang="en-US" sz="1400" dirty="0" smtClean="0"/>
+                <a:t>メール</a:t>
+              </a:r>
+              <a:endParaRPr kumimoji="1" lang="ja-JP" altLang="en-US" sz="1400" dirty="0"/>
+            </a:p>
+          </p:txBody>
+        </p:sp>
+        <p:sp>
+          <p:nvSpPr>
+            <p:cNvPr id="26" name="円/楕円 25"/>
+            <p:cNvSpPr/>
+            <p:nvPr/>
+          </p:nvSpPr>
+          <p:spPr>
+            <a:xfrm>
+              <a:off x="3994642" y="4750654"/>
+              <a:ext cx="2238327" cy="757702"/>
+            </a:xfrm>
+            <a:prstGeom prst="ellipse">
+              <a:avLst/>
+            </a:prstGeom>
+            <a:solidFill>
+              <a:schemeClr val="accent4">
+                <a:lumMod val="75000"/>
+              </a:schemeClr>
+            </a:solidFill>
+          </p:spPr>
+          <p:style>
+            <a:lnRef idx="1">
+              <a:schemeClr val="accent1"/>
+            </a:lnRef>
+            <a:fillRef idx="3">
+              <a:schemeClr val="accent1"/>
+            </a:fillRef>
+            <a:effectRef idx="2">
+              <a:schemeClr val="accent1"/>
+            </a:effectRef>
+            <a:fontRef idx="minor">
+              <a:schemeClr val="lt1"/>
+            </a:fontRef>
+          </p:style>
+          <p:txBody>
+            <a:bodyPr rtlCol="0" anchor="ctr"/>
+            <a:lstStyle/>
+            <a:p>
+              <a:pPr algn="ctr"/>
+              <a:r>
+                <a:rPr kumimoji="1" lang="ja-JP" altLang="en-US" sz="1400" dirty="0" smtClean="0"/>
+                <a:t>リスティング広告</a:t>
+              </a:r>
+              <a:endParaRPr kumimoji="1" lang="ja-JP" altLang="en-US" sz="1400" dirty="0"/>
+            </a:p>
+          </p:txBody>
+        </p:sp>
+        <p:sp>
+          <p:nvSpPr>
+            <p:cNvPr id="27" name="円/楕円 26"/>
+            <p:cNvSpPr/>
+            <p:nvPr/>
+          </p:nvSpPr>
+          <p:spPr>
+            <a:xfrm>
+              <a:off x="3709453" y="5508356"/>
+              <a:ext cx="1613342" cy="510441"/>
+            </a:xfrm>
+            <a:prstGeom prst="ellipse">
+              <a:avLst/>
+            </a:prstGeom>
+            <a:solidFill>
+              <a:schemeClr val="accent4">
+                <a:lumMod val="75000"/>
+              </a:schemeClr>
+            </a:solidFill>
+          </p:spPr>
+          <p:style>
+            <a:lnRef idx="1">
+              <a:schemeClr val="accent1"/>
+            </a:lnRef>
+            <a:fillRef idx="3">
+              <a:schemeClr val="accent1"/>
+            </a:fillRef>
+            <a:effectRef idx="2">
+              <a:schemeClr val="accent1"/>
+            </a:effectRef>
+            <a:fontRef idx="minor">
+              <a:schemeClr val="lt1"/>
+            </a:fontRef>
+          </p:style>
+          <p:txBody>
+            <a:bodyPr rtlCol="0" anchor="ctr"/>
+            <a:lstStyle/>
+            <a:p>
+              <a:pPr algn="ctr"/>
+              <a:r>
+                <a:rPr kumimoji="1" lang="ja-JP" altLang="en-US" sz="1200" dirty="0" smtClean="0"/>
+                <a:t>アフィリエイト</a:t>
+              </a:r>
+              <a:endParaRPr kumimoji="1" lang="ja-JP" altLang="en-US" sz="1200" dirty="0"/>
+            </a:p>
+          </p:txBody>
+        </p:sp>
+        <p:sp>
+          <p:nvSpPr>
+            <p:cNvPr id="31" name="角丸四角形 30"/>
+            <p:cNvSpPr/>
+            <p:nvPr/>
+          </p:nvSpPr>
+          <p:spPr>
+            <a:xfrm>
+              <a:off x="6734595" y="3806152"/>
+              <a:ext cx="1195364" cy="2106055"/>
+            </a:xfrm>
+            <a:prstGeom prst="roundRect">
+              <a:avLst/>
+            </a:prstGeom>
+          </p:spPr>
+          <p:style>
+            <a:lnRef idx="1">
+              <a:schemeClr val="accent1"/>
+            </a:lnRef>
+            <a:fillRef idx="3">
+              <a:schemeClr val="accent1"/>
+            </a:fillRef>
+            <a:effectRef idx="2">
+              <a:schemeClr val="accent1"/>
+            </a:effectRef>
+            <a:fontRef idx="minor">
+              <a:schemeClr val="lt1"/>
+            </a:fontRef>
+          </p:style>
+          <p:txBody>
+            <a:bodyPr rtlCol="0" anchor="ctr"/>
+            <a:lstStyle/>
+            <a:p>
+              <a:pPr algn="ctr"/>
+              <a:r>
+                <a:rPr kumimoji="1" lang="ja-JP" altLang="en-US" sz="1400" dirty="0" smtClean="0"/>
+                <a:t>自社サイト</a:t>
+              </a:r>
+              <a:endParaRPr kumimoji="1" lang="ja-JP" altLang="en-US" sz="1400" dirty="0"/>
+            </a:p>
+          </p:txBody>
+        </p:sp>
+        <p:sp>
+          <p:nvSpPr>
+            <p:cNvPr id="32" name="角丸四角形 31"/>
+            <p:cNvSpPr/>
+            <p:nvPr/>
+          </p:nvSpPr>
+          <p:spPr>
+            <a:xfrm>
+              <a:off x="8239472" y="812360"/>
+              <a:ext cx="565664" cy="3205799"/>
+            </a:xfrm>
+            <a:prstGeom prst="roundRect">
+              <a:avLst/>
+            </a:prstGeom>
+          </p:spPr>
+          <p:style>
+            <a:lnRef idx="1">
+              <a:schemeClr val="accent1"/>
+            </a:lnRef>
+            <a:fillRef idx="3">
+              <a:schemeClr val="accent1"/>
+            </a:fillRef>
+            <a:effectRef idx="2">
+              <a:schemeClr val="accent1"/>
+            </a:effectRef>
+            <a:fontRef idx="minor">
+              <a:schemeClr val="lt1"/>
+            </a:fontRef>
+          </p:style>
+          <p:txBody>
+            <a:bodyPr rtlCol="0" anchor="ctr"/>
+            <a:lstStyle/>
+            <a:p>
+              <a:pPr algn="ctr"/>
+              <a:r>
+                <a:rPr kumimoji="1" lang="ja-JP" altLang="en-US" sz="1400" dirty="0" smtClean="0"/>
+                <a:t>店舗</a:t>
+              </a:r>
+              <a:endParaRPr kumimoji="1" lang="ja-JP" altLang="en-US" sz="1400" dirty="0"/>
+            </a:p>
+          </p:txBody>
+        </p:sp>
+        <p:sp>
+          <p:nvSpPr>
+            <p:cNvPr id="33" name="角丸四角形 32"/>
+            <p:cNvSpPr/>
+            <p:nvPr/>
+          </p:nvSpPr>
+          <p:spPr>
+            <a:xfrm>
+              <a:off x="8239472" y="4137072"/>
+              <a:ext cx="565664" cy="1748917"/>
+            </a:xfrm>
+            <a:prstGeom prst="roundRect">
+              <a:avLst/>
+            </a:prstGeom>
+          </p:spPr>
+          <p:style>
+            <a:lnRef idx="1">
+              <a:schemeClr val="accent1"/>
+            </a:lnRef>
+            <a:fillRef idx="3">
+              <a:schemeClr val="accent1"/>
+            </a:fillRef>
+            <a:effectRef idx="2">
+              <a:schemeClr val="accent1"/>
+            </a:effectRef>
+            <a:fontRef idx="minor">
+              <a:schemeClr val="lt1"/>
+            </a:fontRef>
+          </p:style>
+          <p:txBody>
+            <a:bodyPr rtlCol="0" anchor="ctr"/>
+            <a:lstStyle/>
+            <a:p>
+              <a:pPr algn="ctr"/>
+              <a:r>
+                <a:rPr kumimoji="1" lang="ja-JP" altLang="en-US" sz="1400" dirty="0" smtClean="0"/>
+                <a:t>通販</a:t>
+              </a:r>
+              <a:endParaRPr kumimoji="1" lang="ja-JP" altLang="en-US" sz="1400" dirty="0"/>
+            </a:p>
+          </p:txBody>
+        </p:sp>
+        <p:sp>
+          <p:nvSpPr>
+            <p:cNvPr id="34" name="左右矢印 33"/>
+            <p:cNvSpPr/>
+            <p:nvPr/>
+          </p:nvSpPr>
+          <p:spPr>
+            <a:xfrm rot="2629000">
+              <a:off x="2091941" y="2926285"/>
+              <a:ext cx="2666273" cy="286118"/>
+            </a:xfrm>
+            <a:prstGeom prst="leftRightArrow">
+              <a:avLst/>
+            </a:prstGeom>
+          </p:spPr>
+          <p:style>
+            <a:lnRef idx="1">
+              <a:schemeClr val="accent1"/>
+            </a:lnRef>
+            <a:fillRef idx="3">
+              <a:schemeClr val="accent1"/>
+            </a:fillRef>
+            <a:effectRef idx="2">
+              <a:schemeClr val="accent1"/>
+            </a:effectRef>
+            <a:fontRef idx="minor">
+              <a:schemeClr val="lt1"/>
+            </a:fontRef>
+          </p:style>
+          <p:txBody>
+            <a:bodyPr rtlCol="0" anchor="ctr"/>
+            <a:lstStyle/>
+            <a:p>
+              <a:pPr algn="ctr"/>
+              <a:endParaRPr kumimoji="1" lang="ja-JP" altLang="en-US"/>
+            </a:p>
+          </p:txBody>
+        </p:sp>
+        <p:sp>
+          <p:nvSpPr>
+            <p:cNvPr id="28" name="円/楕円 27"/>
+            <p:cNvSpPr/>
+            <p:nvPr/>
+          </p:nvSpPr>
+          <p:spPr>
+            <a:xfrm>
+              <a:off x="3300903" y="2068308"/>
+              <a:ext cx="3316290" cy="1539121"/>
+            </a:xfrm>
+            <a:prstGeom prst="ellipse">
+              <a:avLst/>
+            </a:prstGeom>
+            <a:solidFill>
+              <a:schemeClr val="tx2">
+                <a:lumMod val="60000"/>
+                <a:lumOff val="40000"/>
+              </a:schemeClr>
+            </a:solidFill>
+          </p:spPr>
+          <p:style>
+            <a:lnRef idx="1">
+              <a:schemeClr val="accent1"/>
+            </a:lnRef>
+            <a:fillRef idx="3">
+              <a:schemeClr val="accent1"/>
+            </a:fillRef>
+            <a:effectRef idx="2">
+              <a:schemeClr val="accent1"/>
+            </a:effectRef>
+            <a:fontRef idx="minor">
+              <a:schemeClr val="lt1"/>
+            </a:fontRef>
+          </p:style>
+          <p:txBody>
+            <a:bodyPr rtlCol="0" anchor="ctr"/>
+            <a:lstStyle/>
+            <a:p>
+              <a:pPr algn="ctr"/>
+              <a:r>
+                <a:rPr kumimoji="1" lang="ja-JP" altLang="en-US" dirty="0" smtClean="0"/>
+                <a:t>ソーシャルメディア</a:t>
+              </a:r>
+              <a:endParaRPr kumimoji="1" lang="ja-JP" altLang="en-US" dirty="0"/>
+            </a:p>
+          </p:txBody>
+        </p:sp>
+        <p:sp>
+          <p:nvSpPr>
+            <p:cNvPr id="35" name="左右矢印 34"/>
+            <p:cNvSpPr/>
+            <p:nvPr/>
+          </p:nvSpPr>
+          <p:spPr>
+            <a:xfrm rot="3239935">
+              <a:off x="1842695" y="2696403"/>
+              <a:ext cx="1432458" cy="286118"/>
+            </a:xfrm>
+            <a:prstGeom prst="leftRightArrow">
+              <a:avLst/>
+            </a:prstGeom>
+          </p:spPr>
+          <p:style>
+            <a:lnRef idx="1">
+              <a:schemeClr val="accent1"/>
+            </a:lnRef>
+            <a:fillRef idx="3">
+              <a:schemeClr val="accent1"/>
+            </a:fillRef>
+            <a:effectRef idx="2">
+              <a:schemeClr val="accent1"/>
+            </a:effectRef>
+            <a:fontRef idx="minor">
+              <a:schemeClr val="lt1"/>
+            </a:fontRef>
+          </p:style>
+          <p:txBody>
+            <a:bodyPr rtlCol="0" anchor="ctr"/>
+            <a:lstStyle/>
+            <a:p>
+              <a:pPr algn="ctr"/>
+              <a:endParaRPr kumimoji="1" lang="ja-JP" altLang="en-US"/>
+            </a:p>
+          </p:txBody>
+        </p:sp>
+        <p:sp>
+          <p:nvSpPr>
+            <p:cNvPr id="16" name="円/楕円 15"/>
+            <p:cNvSpPr/>
+            <p:nvPr/>
+          </p:nvSpPr>
+          <p:spPr>
+            <a:xfrm>
+              <a:off x="1067289" y="650983"/>
+              <a:ext cx="1899774" cy="1696824"/>
+            </a:xfrm>
+            <a:prstGeom prst="ellipse">
+              <a:avLst/>
+            </a:prstGeom>
+          </p:spPr>
+          <p:style>
+            <a:lnRef idx="1">
+              <a:schemeClr val="accent1"/>
+            </a:lnRef>
+            <a:fillRef idx="3">
+              <a:schemeClr val="accent1"/>
+            </a:fillRef>
+            <a:effectRef idx="2">
+              <a:schemeClr val="accent1"/>
+            </a:effectRef>
+            <a:fontRef idx="minor">
+              <a:schemeClr val="lt1"/>
+            </a:fontRef>
+          </p:style>
+          <p:txBody>
+            <a:bodyPr rtlCol="0" anchor="ctr"/>
+            <a:lstStyle/>
+            <a:p>
+              <a:pPr algn="ctr"/>
+              <a:r>
+                <a:rPr kumimoji="1" lang="ja-JP" altLang="en-US" dirty="0" smtClean="0"/>
+                <a:t>テレビ</a:t>
+              </a:r>
+              <a:endParaRPr kumimoji="1" lang="en-US" altLang="ja-JP" dirty="0" smtClean="0"/>
+            </a:p>
+            <a:p>
+              <a:pPr algn="ctr"/>
+              <a:r>
+                <a:rPr kumimoji="1" lang="ja-JP" altLang="en-US" dirty="0" smtClean="0"/>
+                <a:t>広告</a:t>
+              </a:r>
+              <a:endParaRPr kumimoji="1" lang="ja-JP" altLang="en-US" dirty="0"/>
+            </a:p>
+          </p:txBody>
+        </p:sp>
+        <p:sp>
+          <p:nvSpPr>
+            <p:cNvPr id="36" name="左右矢印 35"/>
+            <p:cNvSpPr/>
+            <p:nvPr/>
+          </p:nvSpPr>
+          <p:spPr>
+            <a:xfrm rot="3239935">
+              <a:off x="3353198" y="4485108"/>
+              <a:ext cx="1006185" cy="286118"/>
+            </a:xfrm>
+            <a:prstGeom prst="leftRightArrow">
+              <a:avLst/>
+            </a:prstGeom>
+          </p:spPr>
+          <p:style>
+            <a:lnRef idx="1">
+              <a:schemeClr val="accent1"/>
+            </a:lnRef>
+            <a:fillRef idx="3">
+              <a:schemeClr val="accent1"/>
+            </a:fillRef>
+            <a:effectRef idx="2">
+              <a:schemeClr val="accent1"/>
+            </a:effectRef>
+            <a:fontRef idx="minor">
+              <a:schemeClr val="lt1"/>
+            </a:fontRef>
+          </p:style>
+          <p:txBody>
+            <a:bodyPr rtlCol="0" anchor="ctr"/>
+            <a:lstStyle/>
+            <a:p>
+              <a:pPr algn="ctr"/>
+              <a:endParaRPr kumimoji="1" lang="ja-JP" altLang="en-US"/>
+            </a:p>
+          </p:txBody>
+        </p:sp>
+        <p:sp>
+          <p:nvSpPr>
+            <p:cNvPr id="37" name="左右矢印 36"/>
+            <p:cNvSpPr/>
+            <p:nvPr/>
+          </p:nvSpPr>
+          <p:spPr>
+            <a:xfrm>
+              <a:off x="3616813" y="3912809"/>
+              <a:ext cx="892886" cy="286118"/>
+            </a:xfrm>
+            <a:prstGeom prst="leftRightArrow">
+              <a:avLst/>
+            </a:prstGeom>
+          </p:spPr>
+          <p:style>
+            <a:lnRef idx="1">
+              <a:schemeClr val="accent1"/>
+            </a:lnRef>
+            <a:fillRef idx="3">
+              <a:schemeClr val="accent1"/>
+            </a:fillRef>
+            <a:effectRef idx="2">
+              <a:schemeClr val="accent1"/>
+            </a:effectRef>
+            <a:fontRef idx="minor">
+              <a:schemeClr val="lt1"/>
+            </a:fontRef>
+          </p:style>
+          <p:txBody>
+            <a:bodyPr rtlCol="0" anchor="ctr"/>
+            <a:lstStyle/>
+            <a:p>
+              <a:pPr algn="ctr"/>
+              <a:endParaRPr kumimoji="1" lang="ja-JP" altLang="en-US"/>
+            </a:p>
+          </p:txBody>
+        </p:sp>
+        <p:sp>
+          <p:nvSpPr>
+            <p:cNvPr id="38" name="左右矢印 37"/>
+            <p:cNvSpPr/>
+            <p:nvPr/>
+          </p:nvSpPr>
+          <p:spPr>
+            <a:xfrm>
+              <a:off x="2410997" y="4464536"/>
+              <a:ext cx="4323598" cy="286118"/>
+            </a:xfrm>
+            <a:prstGeom prst="leftRightArrow">
+              <a:avLst/>
+            </a:prstGeom>
+          </p:spPr>
+          <p:style>
+            <a:lnRef idx="1">
+              <a:schemeClr val="accent1"/>
+            </a:lnRef>
+            <a:fillRef idx="3">
+              <a:schemeClr val="accent1"/>
+            </a:fillRef>
+            <a:effectRef idx="2">
+              <a:schemeClr val="accent1"/>
+            </a:effectRef>
+            <a:fontRef idx="minor">
+              <a:schemeClr val="lt1"/>
+            </a:fontRef>
+          </p:style>
+          <p:txBody>
+            <a:bodyPr rtlCol="0" anchor="ctr"/>
+            <a:lstStyle/>
+            <a:p>
+              <a:pPr algn="ctr"/>
+              <a:endParaRPr kumimoji="1" lang="ja-JP" altLang="en-US"/>
+            </a:p>
+          </p:txBody>
+        </p:sp>
+        <p:sp>
+          <p:nvSpPr>
+            <p:cNvPr id="25" name="円/楕円 24"/>
+            <p:cNvSpPr/>
+            <p:nvPr/>
+          </p:nvSpPr>
+          <p:spPr>
+            <a:xfrm>
+              <a:off x="4285788" y="3743446"/>
+              <a:ext cx="2053909" cy="909482"/>
+            </a:xfrm>
+            <a:prstGeom prst="ellipse">
+              <a:avLst/>
+            </a:prstGeom>
+            <a:solidFill>
+              <a:schemeClr val="accent4">
+                <a:lumMod val="75000"/>
+              </a:schemeClr>
+            </a:solidFill>
+          </p:spPr>
+          <p:style>
+            <a:lnRef idx="1">
+              <a:schemeClr val="accent1"/>
+            </a:lnRef>
+            <a:fillRef idx="3">
+              <a:schemeClr val="accent1"/>
+            </a:fillRef>
+            <a:effectRef idx="2">
+              <a:schemeClr val="accent1"/>
+            </a:effectRef>
+            <a:fontRef idx="minor">
+              <a:schemeClr val="lt1"/>
+            </a:fontRef>
+          </p:style>
+          <p:txBody>
+            <a:bodyPr rtlCol="0" anchor="ctr"/>
+            <a:lstStyle/>
+            <a:p>
+              <a:pPr algn="ctr"/>
+              <a:r>
+                <a:rPr kumimoji="1" lang="ja-JP" altLang="en-US" sz="1400" dirty="0" smtClean="0"/>
+                <a:t>自然検索</a:t>
+              </a:r>
+              <a:endParaRPr kumimoji="1" lang="ja-JP" altLang="en-US" sz="1400" dirty="0"/>
+            </a:p>
+          </p:txBody>
+        </p:sp>
+        <p:sp>
+          <p:nvSpPr>
+            <p:cNvPr id="39" name="左右矢印 38"/>
+            <p:cNvSpPr/>
+            <p:nvPr/>
+          </p:nvSpPr>
+          <p:spPr>
+            <a:xfrm>
+              <a:off x="6206909" y="4175439"/>
+              <a:ext cx="892886" cy="286118"/>
+            </a:xfrm>
+            <a:prstGeom prst="leftRightArrow">
+              <a:avLst/>
+            </a:prstGeom>
+          </p:spPr>
+          <p:style>
+            <a:lnRef idx="1">
+              <a:schemeClr val="accent1"/>
+            </a:lnRef>
+            <a:fillRef idx="3">
+              <a:schemeClr val="accent1"/>
+            </a:fillRef>
+            <a:effectRef idx="2">
+              <a:schemeClr val="accent1"/>
+            </a:effectRef>
+            <a:fontRef idx="minor">
+              <a:schemeClr val="lt1"/>
+            </a:fontRef>
+          </p:style>
+          <p:txBody>
+            <a:bodyPr rtlCol="0" anchor="ctr"/>
+            <a:lstStyle/>
+            <a:p>
+              <a:pPr algn="ctr"/>
+              <a:endParaRPr kumimoji="1" lang="ja-JP" altLang="en-US"/>
+            </a:p>
+          </p:txBody>
+        </p:sp>
+        <p:sp>
+          <p:nvSpPr>
+            <p:cNvPr id="30" name="角丸四角形 29"/>
+            <p:cNvSpPr/>
+            <p:nvPr/>
+          </p:nvSpPr>
+          <p:spPr>
+            <a:xfrm>
+              <a:off x="6736917" y="1455595"/>
+              <a:ext cx="362878" cy="2639976"/>
+            </a:xfrm>
+            <a:prstGeom prst="roundRect">
+              <a:avLst/>
+            </a:prstGeom>
+          </p:spPr>
+          <p:style>
+            <a:lnRef idx="1">
+              <a:schemeClr val="accent1"/>
+            </a:lnRef>
+            <a:fillRef idx="3">
+              <a:schemeClr val="accent1"/>
+            </a:fillRef>
+            <a:effectRef idx="2">
+              <a:schemeClr val="accent1"/>
+            </a:effectRef>
+            <a:fontRef idx="minor">
+              <a:schemeClr val="lt1"/>
+            </a:fontRef>
+          </p:style>
+          <p:txBody>
+            <a:bodyPr rtlCol="0" anchor="ctr"/>
+            <a:lstStyle/>
+            <a:p>
+              <a:pPr algn="ctr"/>
+              <a:r>
+                <a:rPr kumimoji="1" lang="ja-JP" altLang="en-US" sz="1400" dirty="0" smtClean="0"/>
+                <a:t>ブランディングコンテンツ</a:t>
+              </a:r>
+              <a:endParaRPr kumimoji="1" lang="ja-JP" altLang="en-US" sz="1400" dirty="0"/>
+            </a:p>
+          </p:txBody>
+        </p:sp>
+      </p:grpSp>
+    </p:spTree>
+    <p:extLst>
+      <p:ext uri="{BB962C8B-B14F-4D97-AF65-F5344CB8AC3E}">
+        <p14:creationId xmlns:p14="http://schemas.microsoft.com/office/powerpoint/2010/main" val="3052927797"/>
+      </p:ext>
+    </p:extLst>
+  </p:cSld>
+  <p:clrMapOvr>
+    <a:masterClrMapping/>
+  </p:clrMapOvr>
+</p:sld>
+</file>
+
 <file path=ppt/theme/theme1.xml><?xml version="1.0" encoding="utf-8"?>
 <a:theme xmlns:a="http://schemas.openxmlformats.org/drawingml/2006/main" name="ホワイト">
   <a:themeElements>

</xml_diff>